<commit_message>
Revise and add paraview figure of voronoi grid
</commit_message>
<xml_diff>
--- a/doc/figures/mf6vtk.pptx
+++ b/doc/figures/mf6vtk.pptx
@@ -5,7 +5,7 @@
     <p:sldMasterId id="2147483708" r:id="rId1"/>
   </p:sldMasterIdLst>
   <p:sldIdLst>
-    <p:sldId id="256" r:id="rId2"/>
+    <p:sldId id="257" r:id="rId2"/>
   </p:sldIdLst>
   <p:sldSz cx="6172200" cy="4114800"/>
   <p:notesSz cx="6858000" cy="9144000"/>
@@ -254,7 +254,7 @@
           <a:p>
             <a:fld id="{DCE0A673-C478-6D4D-A4B7-394B079139A0}" type="datetimeFigureOut">
               <a:rPr lang="en-US" smtClean="0"/>
-              <a:t>8/9/22</a:t>
+              <a:t>11/14/22</a:t>
             </a:fld>
             <a:endParaRPr lang="en-US"/>
           </a:p>
@@ -424,7 +424,7 @@
           <a:p>
             <a:fld id="{DCE0A673-C478-6D4D-A4B7-394B079139A0}" type="datetimeFigureOut">
               <a:rPr lang="en-US" smtClean="0"/>
-              <a:t>8/9/22</a:t>
+              <a:t>11/14/22</a:t>
             </a:fld>
             <a:endParaRPr lang="en-US"/>
           </a:p>
@@ -604,7 +604,7 @@
           <a:p>
             <a:fld id="{DCE0A673-C478-6D4D-A4B7-394B079139A0}" type="datetimeFigureOut">
               <a:rPr lang="en-US" smtClean="0"/>
-              <a:t>8/9/22</a:t>
+              <a:t>11/14/22</a:t>
             </a:fld>
             <a:endParaRPr lang="en-US"/>
           </a:p>
@@ -774,7 +774,7 @@
           <a:p>
             <a:fld id="{DCE0A673-C478-6D4D-A4B7-394B079139A0}" type="datetimeFigureOut">
               <a:rPr lang="en-US" smtClean="0"/>
-              <a:t>8/9/22</a:t>
+              <a:t>11/14/22</a:t>
             </a:fld>
             <a:endParaRPr lang="en-US"/>
           </a:p>
@@ -1018,7 +1018,7 @@
           <a:p>
             <a:fld id="{DCE0A673-C478-6D4D-A4B7-394B079139A0}" type="datetimeFigureOut">
               <a:rPr lang="en-US" smtClean="0"/>
-              <a:t>8/9/22</a:t>
+              <a:t>11/14/22</a:t>
             </a:fld>
             <a:endParaRPr lang="en-US"/>
           </a:p>
@@ -1250,7 +1250,7 @@
           <a:p>
             <a:fld id="{DCE0A673-C478-6D4D-A4B7-394B079139A0}" type="datetimeFigureOut">
               <a:rPr lang="en-US" smtClean="0"/>
-              <a:t>8/9/22</a:t>
+              <a:t>11/14/22</a:t>
             </a:fld>
             <a:endParaRPr lang="en-US"/>
           </a:p>
@@ -1617,7 +1617,7 @@
           <a:p>
             <a:fld id="{DCE0A673-C478-6D4D-A4B7-394B079139A0}" type="datetimeFigureOut">
               <a:rPr lang="en-US" smtClean="0"/>
-              <a:t>8/9/22</a:t>
+              <a:t>11/14/22</a:t>
             </a:fld>
             <a:endParaRPr lang="en-US"/>
           </a:p>
@@ -1735,7 +1735,7 @@
           <a:p>
             <a:fld id="{DCE0A673-C478-6D4D-A4B7-394B079139A0}" type="datetimeFigureOut">
               <a:rPr lang="en-US" smtClean="0"/>
-              <a:t>8/9/22</a:t>
+              <a:t>11/14/22</a:t>
             </a:fld>
             <a:endParaRPr lang="en-US"/>
           </a:p>
@@ -1830,7 +1830,7 @@
           <a:p>
             <a:fld id="{DCE0A673-C478-6D4D-A4B7-394B079139A0}" type="datetimeFigureOut">
               <a:rPr lang="en-US" smtClean="0"/>
-              <a:t>8/9/22</a:t>
+              <a:t>11/14/22</a:t>
             </a:fld>
             <a:endParaRPr lang="en-US"/>
           </a:p>
@@ -2107,7 +2107,7 @@
           <a:p>
             <a:fld id="{DCE0A673-C478-6D4D-A4B7-394B079139A0}" type="datetimeFigureOut">
               <a:rPr lang="en-US" smtClean="0"/>
-              <a:t>8/9/22</a:t>
+              <a:t>11/14/22</a:t>
             </a:fld>
             <a:endParaRPr lang="en-US"/>
           </a:p>
@@ -2364,7 +2364,7 @@
           <a:p>
             <a:fld id="{DCE0A673-C478-6D4D-A4B7-394B079139A0}" type="datetimeFigureOut">
               <a:rPr lang="en-US" smtClean="0"/>
-              <a:t>8/9/22</a:t>
+              <a:t>11/14/22</a:t>
             </a:fld>
             <a:endParaRPr lang="en-US"/>
           </a:p>
@@ -2577,7 +2577,7 @@
           <a:p>
             <a:fld id="{DCE0A673-C478-6D4D-A4B7-394B079139A0}" type="datetimeFigureOut">
               <a:rPr lang="en-US" smtClean="0"/>
-              <a:t>8/9/22</a:t>
+              <a:t>11/14/22</a:t>
             </a:fld>
             <a:endParaRPr lang="en-US"/>
           </a:p>
@@ -2984,10 +2984,10 @@
       </p:grpSpPr>
       <p:pic>
         <p:nvPicPr>
-          <p:cNvPr id="2" name="Picture 1">
+          <p:cNvPr id="7" name="Picture 6">
             <a:extLst>
               <a:ext uri="{FF2B5EF4-FFF2-40B4-BE49-F238E27FC236}">
-                <a16:creationId xmlns:a16="http://schemas.microsoft.com/office/drawing/2014/main" id="{2846018C-14A7-C5AD-0707-62A06F9578BA}"/>
+                <a16:creationId xmlns:a16="http://schemas.microsoft.com/office/drawing/2014/main" id="{4FAD89E4-E3CF-31F3-2FB3-11D17FAF2948}"/>
               </a:ext>
             </a:extLst>
           </p:cNvPr>
@@ -3004,8 +3004,8 @@
         </p:blipFill>
         <p:spPr>
           <a:xfrm>
-            <a:off x="100072" y="242788"/>
-            <a:ext cx="3118925" cy="3761654"/>
+            <a:off x="0" y="0"/>
+            <a:ext cx="3877702" cy="4114800"/>
           </a:xfrm>
           <a:prstGeom prst="rect">
             <a:avLst/>
@@ -3014,10 +3014,10 @@
       </p:pic>
       <p:pic>
         <p:nvPicPr>
-          <p:cNvPr id="3" name="Picture 2">
+          <p:cNvPr id="9" name="Picture 8">
             <a:extLst>
               <a:ext uri="{FF2B5EF4-FFF2-40B4-BE49-F238E27FC236}">
-                <a16:creationId xmlns:a16="http://schemas.microsoft.com/office/drawing/2014/main" id="{B5727A24-6F9B-AA65-F27B-5DCF10AD30AB}"/>
+                <a16:creationId xmlns:a16="http://schemas.microsoft.com/office/drawing/2014/main" id="{5620B620-421E-B3A5-BA2F-21C13EF1DF1D}"/>
               </a:ext>
             </a:extLst>
           </p:cNvPr>
@@ -3034,8 +3034,8 @@
         </p:blipFill>
         <p:spPr>
           <a:xfrm>
-            <a:off x="3290325" y="242788"/>
-            <a:ext cx="2785657" cy="3761654"/>
+            <a:off x="2521983" y="0"/>
+            <a:ext cx="3877702" cy="4114800"/>
           </a:xfrm>
           <a:prstGeom prst="rect">
             <a:avLst/>
@@ -3044,10 +3044,10 @@
       </p:pic>
       <p:sp>
         <p:nvSpPr>
-          <p:cNvPr id="6" name="TextBox 5">
+          <p:cNvPr id="10" name="TextBox 9">
             <a:extLst>
               <a:ext uri="{FF2B5EF4-FFF2-40B4-BE49-F238E27FC236}">
-                <a16:creationId xmlns:a16="http://schemas.microsoft.com/office/drawing/2014/main" id="{11D30691-6CC2-D7E5-C2FE-93A84238E25E}"/>
+                <a16:creationId xmlns:a16="http://schemas.microsoft.com/office/drawing/2014/main" id="{4DC1B02E-42F4-CB4D-7790-2640931D6097}"/>
               </a:ext>
             </a:extLst>
           </p:cNvPr>
@@ -3056,7 +3056,7 @@
         </p:nvSpPr>
         <p:spPr>
           <a:xfrm>
-            <a:off x="24400" y="6309"/>
+            <a:off x="300438" y="0"/>
             <a:ext cx="276038" cy="276999"/>
           </a:xfrm>
           <a:prstGeom prst="rect">
@@ -3086,7 +3086,7 @@
           <p:cNvPr id="11" name="TextBox 10">
             <a:extLst>
               <a:ext uri="{FF2B5EF4-FFF2-40B4-BE49-F238E27FC236}">
-                <a16:creationId xmlns:a16="http://schemas.microsoft.com/office/drawing/2014/main" id="{1DCD612C-3E95-8986-BFFF-6FD07B23FC09}"/>
+                <a16:creationId xmlns:a16="http://schemas.microsoft.com/office/drawing/2014/main" id="{78F12128-0096-DEAB-A594-9EB8B7229134}"/>
               </a:ext>
             </a:extLst>
           </p:cNvPr>
@@ -3095,7 +3095,7 @@
         </p:nvSpPr>
         <p:spPr>
           <a:xfrm>
-            <a:off x="3218997" y="6308"/>
+            <a:off x="2822421" y="0"/>
             <a:ext cx="276038" cy="276999"/>
           </a:xfrm>
           <a:prstGeom prst="rect">
@@ -3123,7 +3123,7 @@
     </p:spTree>
     <p:extLst>
       <p:ext uri="{BB962C8B-B14F-4D97-AF65-F5344CB8AC3E}">
-        <p14:creationId xmlns:p14="http://schemas.microsoft.com/office/powerpoint/2010/main" val="642867378"/>
+        <p14:creationId xmlns:p14="http://schemas.microsoft.com/office/powerpoint/2010/main" val="4167101129"/>
       </p:ext>
     </p:extLst>
   </p:cSld>

</xml_diff>